<commit_message>
Added text to PowerPoint for presentation
</commit_message>
<xml_diff>
--- a/docs/TongueAndCheek.pptx
+++ b/docs/TongueAndCheek.pptx
@@ -300,7 +300,7 @@
           <a:p>
             <a:fld id="{83284890-85D2-4D7B-8EF5-15A9C1DB8F42}" type="datetimeFigureOut">
               <a:rPr lang="en-US" smtClean="0"/>
-              <a:t>4/24/19</a:t>
+              <a:t>5/1/19</a:t>
             </a:fld>
             <a:endParaRPr lang="en-US"/>
           </a:p>
@@ -631,7 +631,7 @@
           <a:p>
             <a:fld id="{87157CC2-0FC8-4686-B024-99790E0F5162}" type="datetimeFigureOut">
               <a:rPr lang="en-US" smtClean="0"/>
-              <a:t>4/24/19</a:t>
+              <a:t>5/1/19</a:t>
             </a:fld>
             <a:endParaRPr lang="en-US"/>
           </a:p>
@@ -811,7 +811,7 @@
           <a:p>
             <a:fld id="{F6764DA5-CD3D-4590-A511-FCD3BC7A793E}" type="datetimeFigureOut">
               <a:rPr lang="en-US" smtClean="0"/>
-              <a:t>4/24/19</a:t>
+              <a:t>5/1/19</a:t>
             </a:fld>
             <a:endParaRPr lang="en-US"/>
           </a:p>
@@ -981,7 +981,7 @@
           <a:p>
             <a:fld id="{82F5661D-6934-4B32-B92C-470368BF1EC6}" type="datetimeFigureOut">
               <a:rPr lang="en-US" smtClean="0"/>
-              <a:t>4/24/19</a:t>
+              <a:t>5/1/19</a:t>
             </a:fld>
             <a:endParaRPr lang="en-US"/>
           </a:p>
@@ -1258,7 +1258,7 @@
           <a:p>
             <a:fld id="{C6F822A4-8DA6-4447-9B1F-C5DB58435268}" type="datetimeFigureOut">
               <a:rPr lang="en-US" smtClean="0"/>
-              <a:t>4/24/19</a:t>
+              <a:t>5/1/19</a:t>
             </a:fld>
             <a:endParaRPr lang="en-US" dirty="0"/>
           </a:p>
@@ -1709,7 +1709,7 @@
           <a:p>
             <a:fld id="{E548D31E-DCDA-41A7-9C67-C4B11B94D21D}" type="datetimeFigureOut">
               <a:rPr lang="en-US" smtClean="0"/>
-              <a:t>4/24/19</a:t>
+              <a:t>5/1/19</a:t>
             </a:fld>
             <a:endParaRPr lang="en-US"/>
           </a:p>
@@ -2191,7 +2191,7 @@
           <a:p>
             <a:fld id="{8664C608-40B1-4030-A28D-5B74BC98ADCE}" type="datetimeFigureOut">
               <a:rPr lang="en-US" smtClean="0"/>
-              <a:t>4/24/19</a:t>
+              <a:t>5/1/19</a:t>
             </a:fld>
             <a:endParaRPr lang="en-US" dirty="0"/>
           </a:p>
@@ -2311,7 +2311,7 @@
           <a:p>
             <a:fld id="{677919A6-33EB-49BD-A62F-1FA56B9F9712}" type="datetimeFigureOut">
               <a:rPr lang="en-US" smtClean="0"/>
-              <a:t>4/24/19</a:t>
+              <a:t>5/1/19</a:t>
             </a:fld>
             <a:endParaRPr lang="en-US"/>
           </a:p>
@@ -2406,7 +2406,7 @@
           <a:p>
             <a:fld id="{CA4E7D1B-D673-4CF6-8672-009D42ABD2A0}" type="datetimeFigureOut">
               <a:rPr lang="en-US" smtClean="0"/>
-              <a:t>4/24/19</a:t>
+              <a:t>5/1/19</a:t>
             </a:fld>
             <a:endParaRPr lang="en-US"/>
           </a:p>
@@ -2754,7 +2754,7 @@
           <a:p>
             <a:fld id="{DA16AA21-1863-4931-97CB-99D0A168701B}" type="datetimeFigureOut">
               <a:rPr lang="en-US" smtClean="0"/>
-              <a:t>4/24/19</a:t>
+              <a:t>5/1/19</a:t>
             </a:fld>
             <a:endParaRPr lang="en-US"/>
           </a:p>
@@ -3187,7 +3187,7 @@
           <a:p>
             <a:fld id="{3772C379-9A7C-4C87-A116-CBE9F58B04C5}" type="datetimeFigureOut">
               <a:rPr lang="en-US" smtClean="0"/>
-              <a:t>4/24/19</a:t>
+              <a:t>5/1/19</a:t>
             </a:fld>
             <a:endParaRPr lang="en-US"/>
           </a:p>
@@ -3503,7 +3503,7 @@
           <a:p>
             <a:fld id="{8664C608-40B1-4030-A28D-5B74BC98ADCE}" type="datetimeFigureOut">
               <a:rPr lang="en-US" smtClean="0"/>
-              <a:t>4/24/19</a:t>
+              <a:t>5/1/19</a:t>
             </a:fld>
             <a:endParaRPr lang="en-US" dirty="0"/>
           </a:p>
@@ -4242,6 +4242,38 @@
           <a:bodyPr/>
           <a:lstStyle/>
           <a:p>
+            <a:pPr fontAlgn="base"/>
+            <a:r>
+              <a:rPr lang="en-US" dirty="0"/>
+              <a:t>2D side scroller game </a:t>
+            </a:r>
+            <a:r>
+              <a:rPr lang="en-US" b="1" dirty="0"/>
+              <a:t>(This was taken from project proposal and may need changing)</a:t>
+            </a:r>
+          </a:p>
+          <a:p>
+            <a:pPr fontAlgn="base"/>
+            <a:r>
+              <a:rPr lang="en-US" dirty="0"/>
+              <a:t>Built in Unity</a:t>
+            </a:r>
+          </a:p>
+          <a:p>
+            <a:pPr fontAlgn="base"/>
+            <a:r>
+              <a:rPr lang="en-US" dirty="0"/>
+              <a:t>Character given simple tools to traverse through a map in a specific amount of time</a:t>
+            </a:r>
+          </a:p>
+          <a:p>
+            <a:pPr fontAlgn="base"/>
+            <a:r>
+              <a:rPr lang="en-US" dirty="0"/>
+              <a:t>Inspiration: QWOP, Getting Over It</a:t>
+            </a:r>
+          </a:p>
+          <a:p>
             <a:endParaRPr lang="en-US" dirty="0"/>
           </a:p>
         </p:txBody>
@@ -4328,7 +4360,32 @@
           <a:bodyPr/>
           <a:lstStyle/>
           <a:p>
-            <a:endParaRPr lang="en-US"/>
+            <a:pPr fontAlgn="base"/>
+            <a:r>
+              <a:rPr lang="en-US" dirty="0"/>
+              <a:t>Challenge ourselves with interdisciplinary project</a:t>
+            </a:r>
+          </a:p>
+          <a:p>
+            <a:pPr fontAlgn="base"/>
+            <a:r>
+              <a:rPr lang="en-US" dirty="0"/>
+              <a:t>Develop working 2D platformer game in Unity</a:t>
+            </a:r>
+          </a:p>
+          <a:p>
+            <a:pPr fontAlgn="base"/>
+            <a:r>
+              <a:rPr lang="en-US" dirty="0"/>
+              <a:t>Learn a lot about game development</a:t>
+            </a:r>
+          </a:p>
+          <a:p>
+            <a:pPr fontAlgn="base"/>
+            <a:r>
+              <a:rPr lang="en-US" dirty="0"/>
+              <a:t>Have fun!</a:t>
+            </a:r>
           </a:p>
         </p:txBody>
       </p:sp>
@@ -4411,10 +4468,98 @@
         </p:nvSpPr>
         <p:spPr/>
         <p:txBody>
-          <a:bodyPr/>
+          <a:bodyPr>
+            <a:normAutofit fontScale="92500" lnSpcReduction="20000"/>
+          </a:bodyPr>
           <a:lstStyle/>
           <a:p>
-            <a:endParaRPr lang="en-US"/>
+            <a:pPr fontAlgn="base"/>
+            <a:r>
+              <a:rPr lang="en-US" u="sng" dirty="0"/>
+              <a:t>Fun</a:t>
+            </a:r>
+            <a:r>
+              <a:rPr lang="en-US" dirty="0"/>
+              <a:t>.: something different and exciting! </a:t>
+            </a:r>
+            <a:r>
+              <a:rPr lang="en-US" b="1" dirty="0"/>
+              <a:t>(This was taken from project proposal and may need changing)</a:t>
+            </a:r>
+          </a:p>
+          <a:p>
+            <a:pPr lvl="1" fontAlgn="base"/>
+            <a:r>
+              <a:rPr lang="en-US" i="0" dirty="0"/>
+              <a:t>Also a band</a:t>
+            </a:r>
+          </a:p>
+          <a:p>
+            <a:pPr fontAlgn="base"/>
+            <a:r>
+              <a:rPr lang="en-US" u="sng" dirty="0"/>
+              <a:t>Interdisciplinary</a:t>
+            </a:r>
+            <a:r>
+              <a:rPr lang="en-US" dirty="0"/>
+              <a:t>: will be a challenge beyond only code</a:t>
+            </a:r>
+          </a:p>
+          <a:p>
+            <a:pPr lvl="1" fontAlgn="base"/>
+            <a:r>
+              <a:rPr lang="en-US" i="0" dirty="0"/>
+              <a:t>Computer Science (duh)</a:t>
+            </a:r>
+          </a:p>
+          <a:p>
+            <a:pPr lvl="1" fontAlgn="base"/>
+            <a:r>
+              <a:rPr lang="en-US" i="0" dirty="0"/>
+              <a:t>Graphic Design</a:t>
+            </a:r>
+          </a:p>
+          <a:p>
+            <a:pPr lvl="1" fontAlgn="base"/>
+            <a:r>
+              <a:rPr lang="en-US" i="0" dirty="0"/>
+              <a:t>Music</a:t>
+            </a:r>
+          </a:p>
+          <a:p>
+            <a:pPr lvl="1" fontAlgn="base"/>
+            <a:r>
+              <a:rPr lang="en-US" i="0" dirty="0"/>
+              <a:t>Voice…?</a:t>
+            </a:r>
+          </a:p>
+          <a:p>
+            <a:pPr fontAlgn="base"/>
+            <a:r>
+              <a:rPr lang="en-US" u="sng" dirty="0"/>
+              <a:t>Scalable</a:t>
+            </a:r>
+            <a:r>
+              <a:rPr lang="en-US" dirty="0"/>
+              <a:t>: lots of aspects can be expanded</a:t>
+            </a:r>
+          </a:p>
+          <a:p>
+            <a:pPr lvl="1" fontAlgn="base"/>
+            <a:r>
+              <a:rPr lang="en-US" i="0" dirty="0"/>
+              <a:t>Graphics/textures can always be improved</a:t>
+            </a:r>
+          </a:p>
+          <a:p>
+            <a:pPr lvl="1" fontAlgn="base"/>
+            <a:r>
+              <a:rPr lang="en-US" i="0" dirty="0"/>
+              <a:t>More levels and content can be added</a:t>
+            </a:r>
+          </a:p>
+          <a:p>
+            <a:endParaRPr lang="en-US" dirty="0"/>
           </a:p>
         </p:txBody>
       </p:sp>
@@ -4653,7 +4798,34 @@
           <a:bodyPr/>
           <a:lstStyle/>
           <a:p>
-            <a:endParaRPr lang="en-US"/>
+            <a:r>
+              <a:rPr lang="en-US" dirty="0"/>
+              <a:t>Proper collision physics of Cheek with objects</a:t>
+            </a:r>
+          </a:p>
+          <a:p>
+            <a:r>
+              <a:rPr lang="en-US" dirty="0"/>
+              <a:t>Importing and animating hand-drawn artwork</a:t>
+            </a:r>
+          </a:p>
+          <a:p>
+            <a:r>
+              <a:rPr lang="en-US" dirty="0"/>
+              <a:t>Getting components of Cheek to work synchronously</a:t>
+            </a:r>
+          </a:p>
+          <a:p>
+            <a:r>
+              <a:rPr lang="en-US" dirty="0"/>
+              <a:t>Rope/Grapple mechanics and animation of tongue</a:t>
+            </a:r>
+          </a:p>
+          <a:p>
+            <a:r>
+              <a:rPr lang="en-US" dirty="0"/>
+              <a:t>Parallax background for main menu</a:t>
+            </a:r>
           </a:p>
         </p:txBody>
       </p:sp>
@@ -4739,7 +4911,22 @@
           <a:bodyPr/>
           <a:lstStyle/>
           <a:p>
-            <a:endParaRPr lang="en-US"/>
+            <a:r>
+              <a:rPr lang="en-US" dirty="0"/>
+              <a:t>Add more levels</a:t>
+            </a:r>
+          </a:p>
+          <a:p>
+            <a:r>
+              <a:rPr lang="en-US" dirty="0"/>
+              <a:t>Music!</a:t>
+            </a:r>
+          </a:p>
+          <a:p>
+            <a:r>
+              <a:rPr lang="en-US" dirty="0"/>
+              <a:t>Microtransactions (lol)</a:t>
+            </a:r>
           </a:p>
         </p:txBody>
       </p:sp>

</xml_diff>